<commit_message>
Round 0-Comments on SAP
</commit_message>
<xml_diff>
--- a/SigAsia2020/figs/figures.pptx
+++ b/SigAsia2020/figs/figures.pptx
@@ -8,6 +8,7 @@
     <p:sldId id="256" r:id="rId2"/>
     <p:sldId id="257" r:id="rId3"/>
     <p:sldId id="258" r:id="rId4"/>
+    <p:sldId id="259" r:id="rId5"/>
   </p:sldIdLst>
   <p:sldSz cx="12192000" cy="6858000"/>
   <p:notesSz cx="6858000" cy="9144000"/>
@@ -106,6 +107,11 @@
       </a:defRPr>
     </a:lvl9pPr>
   </p:defaultTextStyle>
+  <p:extLst>
+    <p:ext uri="{EFAFB233-063F-42B5-8137-9DF3F51BA10A}">
+      <p15:sldGuideLst xmlns:p15="http://schemas.microsoft.com/office/powerpoint/2012/main"/>
+    </p:ext>
+  </p:extLst>
 </p:presentation>
 </file>
 
@@ -240,7 +246,7 @@
           <a:p>
             <a:fld id="{0B3F81C6-B4B8-48AA-8FC1-3634FB9BE978}" type="datetimeFigureOut">
               <a:rPr lang="zh-CN" altLang="en-US" smtClean="0"/>
-              <a:t>2020/4/2</a:t>
+              <a:t>2020/4/26</a:t>
             </a:fld>
             <a:endParaRPr lang="zh-CN" altLang="en-US"/>
           </a:p>
@@ -410,7 +416,7 @@
           <a:p>
             <a:fld id="{0B3F81C6-B4B8-48AA-8FC1-3634FB9BE978}" type="datetimeFigureOut">
               <a:rPr lang="zh-CN" altLang="en-US" smtClean="0"/>
-              <a:t>2020/4/2</a:t>
+              <a:t>2020/4/26</a:t>
             </a:fld>
             <a:endParaRPr lang="zh-CN" altLang="en-US"/>
           </a:p>
@@ -590,7 +596,7 @@
           <a:p>
             <a:fld id="{0B3F81C6-B4B8-48AA-8FC1-3634FB9BE978}" type="datetimeFigureOut">
               <a:rPr lang="zh-CN" altLang="en-US" smtClean="0"/>
-              <a:t>2020/4/2</a:t>
+              <a:t>2020/4/26</a:t>
             </a:fld>
             <a:endParaRPr lang="zh-CN" altLang="en-US"/>
           </a:p>
@@ -760,7 +766,7 @@
           <a:p>
             <a:fld id="{0B3F81C6-B4B8-48AA-8FC1-3634FB9BE978}" type="datetimeFigureOut">
               <a:rPr lang="zh-CN" altLang="en-US" smtClean="0"/>
-              <a:t>2020/4/2</a:t>
+              <a:t>2020/4/26</a:t>
             </a:fld>
             <a:endParaRPr lang="zh-CN" altLang="en-US"/>
           </a:p>
@@ -1006,7 +1012,7 @@
           <a:p>
             <a:fld id="{0B3F81C6-B4B8-48AA-8FC1-3634FB9BE978}" type="datetimeFigureOut">
               <a:rPr lang="zh-CN" altLang="en-US" smtClean="0"/>
-              <a:t>2020/4/2</a:t>
+              <a:t>2020/4/26</a:t>
             </a:fld>
             <a:endParaRPr lang="zh-CN" altLang="en-US"/>
           </a:p>
@@ -1238,7 +1244,7 @@
           <a:p>
             <a:fld id="{0B3F81C6-B4B8-48AA-8FC1-3634FB9BE978}" type="datetimeFigureOut">
               <a:rPr lang="zh-CN" altLang="en-US" smtClean="0"/>
-              <a:t>2020/4/2</a:t>
+              <a:t>2020/4/26</a:t>
             </a:fld>
             <a:endParaRPr lang="zh-CN" altLang="en-US"/>
           </a:p>
@@ -1605,7 +1611,7 @@
           <a:p>
             <a:fld id="{0B3F81C6-B4B8-48AA-8FC1-3634FB9BE978}" type="datetimeFigureOut">
               <a:rPr lang="zh-CN" altLang="en-US" smtClean="0"/>
-              <a:t>2020/4/2</a:t>
+              <a:t>2020/4/26</a:t>
             </a:fld>
             <a:endParaRPr lang="zh-CN" altLang="en-US"/>
           </a:p>
@@ -1723,7 +1729,7 @@
           <a:p>
             <a:fld id="{0B3F81C6-B4B8-48AA-8FC1-3634FB9BE978}" type="datetimeFigureOut">
               <a:rPr lang="zh-CN" altLang="en-US" smtClean="0"/>
-              <a:t>2020/4/2</a:t>
+              <a:t>2020/4/26</a:t>
             </a:fld>
             <a:endParaRPr lang="zh-CN" altLang="en-US"/>
           </a:p>
@@ -1818,7 +1824,7 @@
           <a:p>
             <a:fld id="{0B3F81C6-B4B8-48AA-8FC1-3634FB9BE978}" type="datetimeFigureOut">
               <a:rPr lang="zh-CN" altLang="en-US" smtClean="0"/>
-              <a:t>2020/4/2</a:t>
+              <a:t>2020/4/26</a:t>
             </a:fld>
             <a:endParaRPr lang="zh-CN" altLang="en-US"/>
           </a:p>
@@ -2095,7 +2101,7 @@
           <a:p>
             <a:fld id="{0B3F81C6-B4B8-48AA-8FC1-3634FB9BE978}" type="datetimeFigureOut">
               <a:rPr lang="zh-CN" altLang="en-US" smtClean="0"/>
-              <a:t>2020/4/2</a:t>
+              <a:t>2020/4/26</a:t>
             </a:fld>
             <a:endParaRPr lang="zh-CN" altLang="en-US"/>
           </a:p>
@@ -2348,7 +2354,7 @@
           <a:p>
             <a:fld id="{0B3F81C6-B4B8-48AA-8FC1-3634FB9BE978}" type="datetimeFigureOut">
               <a:rPr lang="zh-CN" altLang="en-US" smtClean="0"/>
-              <a:t>2020/4/2</a:t>
+              <a:t>2020/4/26</a:t>
             </a:fld>
             <a:endParaRPr lang="zh-CN" altLang="en-US"/>
           </a:p>
@@ -2561,7 +2567,7 @@
           <a:p>
             <a:fld id="{0B3F81C6-B4B8-48AA-8FC1-3634FB9BE978}" type="datetimeFigureOut">
               <a:rPr lang="zh-CN" altLang="en-US" smtClean="0"/>
-              <a:t>2020/4/2</a:t>
+              <a:t>2020/4/26</a:t>
             </a:fld>
             <a:endParaRPr lang="zh-CN" altLang="en-US"/>
           </a:p>
@@ -3450,6 +3456,505 @@
 </p:sld>
 </file>
 
+<file path=ppt/slides/slide4.xml><?xml version="1.0" encoding="utf-8"?>
+<p:sld xmlns:a="http://schemas.openxmlformats.org/drawingml/2006/main" xmlns:r="http://schemas.openxmlformats.org/officeDocument/2006/relationships" xmlns:p="http://schemas.openxmlformats.org/presentationml/2006/main">
+  <p:cSld>
+    <p:spTree>
+      <p:nvGrpSpPr>
+        <p:cNvPr id="1" name=""/>
+        <p:cNvGrpSpPr/>
+        <p:nvPr/>
+      </p:nvGrpSpPr>
+      <p:grpSpPr>
+        <a:xfrm>
+          <a:off x="0" y="0"/>
+          <a:ext cx="0" cy="0"/>
+          <a:chOff x="0" y="0"/>
+          <a:chExt cx="0" cy="0"/>
+        </a:xfrm>
+      </p:grpSpPr>
+      <p:pic>
+        <p:nvPicPr>
+          <p:cNvPr id="9" name="Picture 8"/>
+          <p:cNvPicPr>
+            <a:picLocks noChangeAspect="1"/>
+          </p:cNvPicPr>
+          <p:nvPr/>
+        </p:nvPicPr>
+        <p:blipFill>
+          <a:blip r:embed="rId2">
+            <a:extLst>
+              <a:ext uri="{28A0092B-C50C-407E-A947-70E740481C1C}">
+                <a14:useLocalDpi xmlns:a14="http://schemas.microsoft.com/office/drawing/2010/main" val="0"/>
+              </a:ext>
+            </a:extLst>
+          </a:blip>
+          <a:stretch>
+            <a:fillRect/>
+          </a:stretch>
+        </p:blipFill>
+        <p:spPr>
+          <a:xfrm>
+            <a:off x="5872681" y="3335448"/>
+            <a:ext cx="2450471" cy="2450471"/>
+          </a:xfrm>
+          <a:prstGeom prst="rect">
+            <a:avLst/>
+          </a:prstGeom>
+        </p:spPr>
+      </p:pic>
+      <p:pic>
+        <p:nvPicPr>
+          <p:cNvPr id="2" name="Picture 1"/>
+          <p:cNvPicPr>
+            <a:picLocks noChangeAspect="1"/>
+          </p:cNvPicPr>
+          <p:nvPr/>
+        </p:nvPicPr>
+        <p:blipFill>
+          <a:blip r:embed="rId3">
+            <a:extLst>
+              <a:ext uri="{28A0092B-C50C-407E-A947-70E740481C1C}">
+                <a14:useLocalDpi xmlns:a14="http://schemas.microsoft.com/office/drawing/2010/main" val="0"/>
+              </a:ext>
+            </a:extLst>
+          </a:blip>
+          <a:stretch>
+            <a:fillRect/>
+          </a:stretch>
+        </p:blipFill>
+        <p:spPr>
+          <a:xfrm>
+            <a:off x="8329188" y="891012"/>
+            <a:ext cx="2444436" cy="2444436"/>
+          </a:xfrm>
+          <a:prstGeom prst="rect">
+            <a:avLst/>
+          </a:prstGeom>
+        </p:spPr>
+      </p:pic>
+      <p:pic>
+        <p:nvPicPr>
+          <p:cNvPr id="3" name="Picture 2"/>
+          <p:cNvPicPr>
+            <a:picLocks noChangeAspect="1"/>
+          </p:cNvPicPr>
+          <p:nvPr/>
+        </p:nvPicPr>
+        <p:blipFill>
+          <a:blip r:embed="rId4">
+            <a:extLst>
+              <a:ext uri="{28A0092B-C50C-407E-A947-70E740481C1C}">
+                <a14:useLocalDpi xmlns:a14="http://schemas.microsoft.com/office/drawing/2010/main" val="0"/>
+              </a:ext>
+            </a:extLst>
+          </a:blip>
+          <a:stretch>
+            <a:fillRect/>
+          </a:stretch>
+        </p:blipFill>
+        <p:spPr>
+          <a:xfrm>
+            <a:off x="8329188" y="3335448"/>
+            <a:ext cx="2432364" cy="2432364"/>
+          </a:xfrm>
+          <a:prstGeom prst="rect">
+            <a:avLst/>
+          </a:prstGeom>
+        </p:spPr>
+      </p:pic>
+      <p:sp>
+        <p:nvSpPr>
+          <p:cNvPr id="10" name="Rectangle 9"/>
+          <p:cNvSpPr/>
+          <p:nvPr/>
+        </p:nvSpPr>
+        <p:spPr>
+          <a:xfrm>
+            <a:off x="5869116" y="3336683"/>
+            <a:ext cx="2448000" cy="2448000"/>
+          </a:xfrm>
+          <a:prstGeom prst="rect">
+            <a:avLst/>
+          </a:prstGeom>
+          <a:blipFill dpi="0" rotWithShape="1">
+            <a:blip r:embed="rId5">
+              <a:alphaModFix amt="16000"/>
+              <a:extLst>
+                <a:ext uri="{28A0092B-C50C-407E-A947-70E740481C1C}">
+                  <a14:useLocalDpi xmlns:a14="http://schemas.microsoft.com/office/drawing/2010/main" val="0"/>
+                </a:ext>
+              </a:extLst>
+            </a:blip>
+            <a:srcRect/>
+            <a:stretch>
+              <a:fillRect/>
+            </a:stretch>
+          </a:blipFill>
+          <a:ln>
+            <a:solidFill>
+              <a:schemeClr val="bg1">
+                <a:lumMod val="85000"/>
+              </a:schemeClr>
+            </a:solidFill>
+          </a:ln>
+        </p:spPr>
+        <p:style>
+          <a:lnRef idx="2">
+            <a:schemeClr val="accent1">
+              <a:shade val="50000"/>
+            </a:schemeClr>
+          </a:lnRef>
+          <a:fillRef idx="1">
+            <a:schemeClr val="accent1"/>
+          </a:fillRef>
+          <a:effectRef idx="0">
+            <a:schemeClr val="accent1"/>
+          </a:effectRef>
+          <a:fontRef idx="minor">
+            <a:schemeClr val="lt1"/>
+          </a:fontRef>
+        </p:style>
+        <p:txBody>
+          <a:bodyPr rtlCol="0" anchor="ctr"/>
+          <a:lstStyle/>
+          <a:p>
+            <a:pPr algn="ctr"/>
+            <a:endParaRPr lang="zh-CN" altLang="en-US"/>
+          </a:p>
+        </p:txBody>
+      </p:sp>
+      <p:pic>
+        <p:nvPicPr>
+          <p:cNvPr id="13" name="Picture 12"/>
+          <p:cNvPicPr>
+            <a:picLocks noChangeAspect="1"/>
+          </p:cNvPicPr>
+          <p:nvPr/>
+        </p:nvPicPr>
+        <p:blipFill>
+          <a:blip r:embed="rId2">
+            <a:extLst>
+              <a:ext uri="{28A0092B-C50C-407E-A947-70E740481C1C}">
+                <a14:useLocalDpi xmlns:a14="http://schemas.microsoft.com/office/drawing/2010/main" val="0"/>
+              </a:ext>
+            </a:extLst>
+          </a:blip>
+          <a:stretch>
+            <a:fillRect/>
+          </a:stretch>
+        </p:blipFill>
+        <p:spPr>
+          <a:xfrm>
+            <a:off x="5881188" y="886212"/>
+            <a:ext cx="2448000" cy="2448000"/>
+          </a:xfrm>
+          <a:prstGeom prst="rect">
+            <a:avLst/>
+          </a:prstGeom>
+        </p:spPr>
+      </p:pic>
+      <p:sp>
+        <p:nvSpPr>
+          <p:cNvPr id="12" name="Rectangle 11"/>
+          <p:cNvSpPr/>
+          <p:nvPr/>
+        </p:nvSpPr>
+        <p:spPr>
+          <a:xfrm>
+            <a:off x="5869116" y="891012"/>
+            <a:ext cx="2448000" cy="2448000"/>
+          </a:xfrm>
+          <a:prstGeom prst="rect">
+            <a:avLst/>
+          </a:prstGeom>
+          <a:blipFill dpi="0" rotWithShape="1">
+            <a:blip r:embed="rId6">
+              <a:alphaModFix amt="16000"/>
+            </a:blip>
+            <a:srcRect/>
+            <a:stretch>
+              <a:fillRect/>
+            </a:stretch>
+          </a:blipFill>
+          <a:ln>
+            <a:solidFill>
+              <a:schemeClr val="bg1">
+                <a:lumMod val="85000"/>
+              </a:schemeClr>
+            </a:solidFill>
+          </a:ln>
+        </p:spPr>
+        <p:style>
+          <a:lnRef idx="2">
+            <a:schemeClr val="accent1">
+              <a:shade val="50000"/>
+            </a:schemeClr>
+          </a:lnRef>
+          <a:fillRef idx="1">
+            <a:schemeClr val="accent1"/>
+          </a:fillRef>
+          <a:effectRef idx="0">
+            <a:schemeClr val="accent1"/>
+          </a:effectRef>
+          <a:fontRef idx="minor">
+            <a:schemeClr val="lt1"/>
+          </a:fontRef>
+        </p:style>
+        <p:txBody>
+          <a:bodyPr rtlCol="0" anchor="ctr"/>
+          <a:lstStyle/>
+          <a:p>
+            <a:pPr algn="ctr"/>
+            <a:endParaRPr lang="zh-CN" altLang="en-US"/>
+          </a:p>
+        </p:txBody>
+      </p:sp>
+      <p:pic>
+        <p:nvPicPr>
+          <p:cNvPr id="14" name="Picture 13"/>
+          <p:cNvPicPr>
+            <a:picLocks noChangeAspect="1"/>
+          </p:cNvPicPr>
+          <p:nvPr/>
+        </p:nvPicPr>
+        <p:blipFill>
+          <a:blip r:embed="rId7">
+            <a:extLst>
+              <a:ext uri="{28A0092B-C50C-407E-A947-70E740481C1C}">
+                <a14:useLocalDpi xmlns:a14="http://schemas.microsoft.com/office/drawing/2010/main" val="0"/>
+              </a:ext>
+            </a:extLst>
+          </a:blip>
+          <a:stretch>
+            <a:fillRect/>
+          </a:stretch>
+        </p:blipFill>
+        <p:spPr>
+          <a:xfrm>
+            <a:off x="3026005" y="886212"/>
+            <a:ext cx="2448000" cy="2448000"/>
+          </a:xfrm>
+          <a:prstGeom prst="rect">
+            <a:avLst/>
+          </a:prstGeom>
+        </p:spPr>
+      </p:pic>
+      <p:pic>
+        <p:nvPicPr>
+          <p:cNvPr id="15" name="Picture 14"/>
+          <p:cNvPicPr>
+            <a:picLocks noChangeAspect="1"/>
+          </p:cNvPicPr>
+          <p:nvPr/>
+        </p:nvPicPr>
+        <p:blipFill>
+          <a:blip r:embed="rId2">
+            <a:extLst>
+              <a:ext uri="{28A0092B-C50C-407E-A947-70E740481C1C}">
+                <a14:useLocalDpi xmlns:a14="http://schemas.microsoft.com/office/drawing/2010/main" val="0"/>
+              </a:ext>
+            </a:extLst>
+          </a:blip>
+          <a:stretch>
+            <a:fillRect/>
+          </a:stretch>
+        </p:blipFill>
+        <p:spPr>
+          <a:xfrm>
+            <a:off x="565933" y="886212"/>
+            <a:ext cx="2448000" cy="2448000"/>
+          </a:xfrm>
+          <a:prstGeom prst="rect">
+            <a:avLst/>
+          </a:prstGeom>
+        </p:spPr>
+      </p:pic>
+      <p:sp>
+        <p:nvSpPr>
+          <p:cNvPr id="16" name="Rectangle 15"/>
+          <p:cNvSpPr/>
+          <p:nvPr/>
+        </p:nvSpPr>
+        <p:spPr>
+          <a:xfrm>
+            <a:off x="565933" y="886212"/>
+            <a:ext cx="2448000" cy="2448000"/>
+          </a:xfrm>
+          <a:prstGeom prst="rect">
+            <a:avLst/>
+          </a:prstGeom>
+          <a:blipFill dpi="0" rotWithShape="1">
+            <a:blip r:embed="rId8">
+              <a:alphaModFix amt="16000"/>
+            </a:blip>
+            <a:srcRect/>
+            <a:stretch>
+              <a:fillRect/>
+            </a:stretch>
+          </a:blipFill>
+          <a:ln>
+            <a:solidFill>
+              <a:schemeClr val="bg1">
+                <a:lumMod val="85000"/>
+              </a:schemeClr>
+            </a:solidFill>
+          </a:ln>
+        </p:spPr>
+        <p:style>
+          <a:lnRef idx="2">
+            <a:schemeClr val="accent1">
+              <a:shade val="50000"/>
+            </a:schemeClr>
+          </a:lnRef>
+          <a:fillRef idx="1">
+            <a:schemeClr val="accent1"/>
+          </a:fillRef>
+          <a:effectRef idx="0">
+            <a:schemeClr val="accent1"/>
+          </a:effectRef>
+          <a:fontRef idx="minor">
+            <a:schemeClr val="lt1"/>
+          </a:fontRef>
+        </p:style>
+        <p:txBody>
+          <a:bodyPr rtlCol="0" anchor="ctr"/>
+          <a:lstStyle/>
+          <a:p>
+            <a:pPr algn="ctr"/>
+            <a:endParaRPr lang="zh-CN" altLang="en-US"/>
+          </a:p>
+        </p:txBody>
+      </p:sp>
+      <p:pic>
+        <p:nvPicPr>
+          <p:cNvPr id="18" name="Picture 17"/>
+          <p:cNvPicPr>
+            <a:picLocks noChangeAspect="1"/>
+          </p:cNvPicPr>
+          <p:nvPr/>
+        </p:nvPicPr>
+        <p:blipFill>
+          <a:blip r:embed="rId2">
+            <a:extLst>
+              <a:ext uri="{28A0092B-C50C-407E-A947-70E740481C1C}">
+                <a14:useLocalDpi xmlns:a14="http://schemas.microsoft.com/office/drawing/2010/main" val="0"/>
+              </a:ext>
+            </a:extLst>
+          </a:blip>
+          <a:stretch>
+            <a:fillRect/>
+          </a:stretch>
+        </p:blipFill>
+        <p:spPr>
+          <a:xfrm>
+            <a:off x="565933" y="3336683"/>
+            <a:ext cx="2448000" cy="2448000"/>
+          </a:xfrm>
+          <a:prstGeom prst="rect">
+            <a:avLst/>
+          </a:prstGeom>
+        </p:spPr>
+      </p:pic>
+      <p:sp>
+        <p:nvSpPr>
+          <p:cNvPr id="19" name="Rectangle 18"/>
+          <p:cNvSpPr/>
+          <p:nvPr/>
+        </p:nvSpPr>
+        <p:spPr>
+          <a:xfrm>
+            <a:off x="565933" y="3336683"/>
+            <a:ext cx="2448000" cy="2448000"/>
+          </a:xfrm>
+          <a:prstGeom prst="rect">
+            <a:avLst/>
+          </a:prstGeom>
+          <a:blipFill dpi="0" rotWithShape="1">
+            <a:blip r:embed="rId9">
+              <a:alphaModFix amt="16000"/>
+            </a:blip>
+            <a:srcRect/>
+            <a:stretch>
+              <a:fillRect/>
+            </a:stretch>
+          </a:blipFill>
+          <a:ln>
+            <a:solidFill>
+              <a:schemeClr val="bg1">
+                <a:lumMod val="85000"/>
+              </a:schemeClr>
+            </a:solidFill>
+          </a:ln>
+        </p:spPr>
+        <p:style>
+          <a:lnRef idx="2">
+            <a:schemeClr val="accent1">
+              <a:shade val="50000"/>
+            </a:schemeClr>
+          </a:lnRef>
+          <a:fillRef idx="1">
+            <a:schemeClr val="accent1"/>
+          </a:fillRef>
+          <a:effectRef idx="0">
+            <a:schemeClr val="accent1"/>
+          </a:effectRef>
+          <a:fontRef idx="minor">
+            <a:schemeClr val="lt1"/>
+          </a:fontRef>
+        </p:style>
+        <p:txBody>
+          <a:bodyPr rtlCol="0" anchor="ctr"/>
+          <a:lstStyle/>
+          <a:p>
+            <a:pPr algn="ctr"/>
+            <a:endParaRPr lang="zh-CN" altLang="en-US"/>
+          </a:p>
+        </p:txBody>
+      </p:sp>
+      <p:pic>
+        <p:nvPicPr>
+          <p:cNvPr id="20" name="Picture 19"/>
+          <p:cNvPicPr>
+            <a:picLocks noChangeAspect="1"/>
+          </p:cNvPicPr>
+          <p:nvPr/>
+        </p:nvPicPr>
+        <p:blipFill>
+          <a:blip r:embed="rId10">
+            <a:extLst>
+              <a:ext uri="{28A0092B-C50C-407E-A947-70E740481C1C}">
+                <a14:useLocalDpi xmlns:a14="http://schemas.microsoft.com/office/drawing/2010/main" val="0"/>
+              </a:ext>
+            </a:extLst>
+          </a:blip>
+          <a:stretch>
+            <a:fillRect/>
+          </a:stretch>
+        </p:blipFill>
+        <p:spPr>
+          <a:xfrm>
+            <a:off x="3026005" y="3319812"/>
+            <a:ext cx="2448000" cy="2448000"/>
+          </a:xfrm>
+          <a:prstGeom prst="rect">
+            <a:avLst/>
+          </a:prstGeom>
+        </p:spPr>
+      </p:pic>
+    </p:spTree>
+    <p:extLst>
+      <p:ext uri="{BB962C8B-B14F-4D97-AF65-F5344CB8AC3E}">
+        <p14:creationId xmlns:p14="http://schemas.microsoft.com/office/powerpoint/2010/main" val="2670102144"/>
+      </p:ext>
+    </p:extLst>
+  </p:cSld>
+  <p:clrMapOvr>
+    <a:masterClrMapping/>
+  </p:clrMapOvr>
+</p:sld>
+</file>
+
 <file path=ppt/theme/theme1.xml><?xml version="1.0" encoding="utf-8"?>
 <a:theme xmlns:a="http://schemas.openxmlformats.org/drawingml/2006/main" name="Office Theme">
   <a:themeElements>

</xml_diff>